<commit_message>
[CONC] Working on final version of Banner/Presentation enhancements
</commit_message>
<xml_diff>
--- a/presentation/presentation_1.1.0.pptx
+++ b/presentation/presentation_1.1.0.pptx
@@ -4660,7 +4660,7 @@
         </p:blipFill>
         <p:spPr>
           <a:xfrm>
-            <a:off x="6084168" y="5086050"/>
+            <a:off x="6156176" y="4798018"/>
             <a:ext cx="2302023" cy="1439294"/>
           </a:xfrm>
           <a:prstGeom prst="rect">
@@ -11289,9 +11289,9 @@
               <a:avLst/>
             </a:prstGeom>
             <a:solidFill>
-              <a:schemeClr val="bg1">
-                <a:lumMod val="50000"/>
-                <a:alpha val="30000"/>
+              <a:schemeClr val="tx2">
+                <a:lumMod val="90000"/>
+                <a:alpha val="26000"/>
               </a:schemeClr>
             </a:solidFill>
             <a:ln w="31750" cap="flat" cmpd="sng">
@@ -11447,9 +11447,9 @@
               <a:avLst/>
             </a:prstGeom>
             <a:solidFill>
-              <a:schemeClr val="bg1">
-                <a:lumMod val="50000"/>
-                <a:alpha val="30000"/>
+              <a:schemeClr val="tx2">
+                <a:lumMod val="90000"/>
+                <a:alpha val="26000"/>
               </a:schemeClr>
             </a:solidFill>
             <a:ln w="31750" cap="flat" cmpd="sng">
@@ -11479,100 +11479,9 @@
           </p:style>
           <p:txBody>
             <a:bodyPr rtlCol="0" anchor="ctr"/>
-            <a:lstStyle>
-              <a:lvl1pPr marL="0" indent="0">
-                <a:defRPr sz="1100">
-                  <a:solidFill>
-                    <a:schemeClr val="tx1"/>
-                  </a:solidFill>
-                  <a:latin typeface="+mn-lt"/>
-                  <a:ea typeface="+mn-ea"/>
-                  <a:cs typeface="+mn-cs"/>
-                </a:defRPr>
-              </a:lvl1pPr>
-              <a:lvl2pPr marL="457200" indent="0">
-                <a:defRPr sz="1100">
-                  <a:solidFill>
-                    <a:schemeClr val="tx1"/>
-                  </a:solidFill>
-                  <a:latin typeface="+mn-lt"/>
-                  <a:ea typeface="+mn-ea"/>
-                  <a:cs typeface="+mn-cs"/>
-                </a:defRPr>
-              </a:lvl2pPr>
-              <a:lvl3pPr marL="914400" indent="0">
-                <a:defRPr sz="1100">
-                  <a:solidFill>
-                    <a:schemeClr val="tx1"/>
-                  </a:solidFill>
-                  <a:latin typeface="+mn-lt"/>
-                  <a:ea typeface="+mn-ea"/>
-                  <a:cs typeface="+mn-cs"/>
-                </a:defRPr>
-              </a:lvl3pPr>
-              <a:lvl4pPr marL="1371600" indent="0">
-                <a:defRPr sz="1100">
-                  <a:solidFill>
-                    <a:schemeClr val="tx1"/>
-                  </a:solidFill>
-                  <a:latin typeface="+mn-lt"/>
-                  <a:ea typeface="+mn-ea"/>
-                  <a:cs typeface="+mn-cs"/>
-                </a:defRPr>
-              </a:lvl4pPr>
-              <a:lvl5pPr marL="1828800" indent="0">
-                <a:defRPr sz="1100">
-                  <a:solidFill>
-                    <a:schemeClr val="tx1"/>
-                  </a:solidFill>
-                  <a:latin typeface="+mn-lt"/>
-                  <a:ea typeface="+mn-ea"/>
-                  <a:cs typeface="+mn-cs"/>
-                </a:defRPr>
-              </a:lvl5pPr>
-              <a:lvl6pPr marL="2286000" indent="0">
-                <a:defRPr sz="1100">
-                  <a:solidFill>
-                    <a:schemeClr val="tx1"/>
-                  </a:solidFill>
-                  <a:latin typeface="+mn-lt"/>
-                  <a:ea typeface="+mn-ea"/>
-                  <a:cs typeface="+mn-cs"/>
-                </a:defRPr>
-              </a:lvl6pPr>
-              <a:lvl7pPr marL="2743200" indent="0">
-                <a:defRPr sz="1100">
-                  <a:solidFill>
-                    <a:schemeClr val="tx1"/>
-                  </a:solidFill>
-                  <a:latin typeface="+mn-lt"/>
-                  <a:ea typeface="+mn-ea"/>
-                  <a:cs typeface="+mn-cs"/>
-                </a:defRPr>
-              </a:lvl7pPr>
-              <a:lvl8pPr marL="3200400" indent="0">
-                <a:defRPr sz="1100">
-                  <a:solidFill>
-                    <a:schemeClr val="tx1"/>
-                  </a:solidFill>
-                  <a:latin typeface="+mn-lt"/>
-                  <a:ea typeface="+mn-ea"/>
-                  <a:cs typeface="+mn-cs"/>
-                </a:defRPr>
-              </a:lvl8pPr>
-              <a:lvl9pPr marL="3657600" indent="0">
-                <a:defRPr sz="1100">
-                  <a:solidFill>
-                    <a:schemeClr val="tx1"/>
-                  </a:solidFill>
-                  <a:latin typeface="+mn-lt"/>
-                  <a:ea typeface="+mn-ea"/>
-                  <a:cs typeface="+mn-cs"/>
-                </a:defRPr>
-              </a:lvl9pPr>
-            </a:lstStyle>
+            <a:lstStyle/>
             <a:p>
-              <a:pPr marL="0" indent="0" algn="ctr"/>
+              <a:pPr algn="ctr"/>
               <a:r>
                 <a:rPr lang="pt-BR" sz="1600" b="1">
                   <a:solidFill>
@@ -11582,7 +11491,6 @@
                     </a:schemeClr>
                   </a:solidFill>
                   <a:latin typeface="Arial" panose="020B0604020202020204" pitchFamily="34" charset="0"/>
-                  <a:ea typeface="+mn-ea"/>
                   <a:cs typeface="Arial" panose="020B0604020202020204" pitchFamily="34" charset="0"/>
                 </a:rPr>
                 <a:t>2. Plano de Qualidade</a:t>
@@ -11605,9 +11513,9 @@
               <a:avLst/>
             </a:prstGeom>
             <a:solidFill>
-              <a:schemeClr val="bg1">
-                <a:lumMod val="50000"/>
-                <a:alpha val="30000"/>
+              <a:schemeClr val="tx2">
+                <a:lumMod val="90000"/>
+                <a:alpha val="26000"/>
               </a:schemeClr>
             </a:solidFill>
             <a:ln w="31750" cap="flat" cmpd="sng">
@@ -11637,102 +11545,11 @@
           </p:style>
           <p:txBody>
             <a:bodyPr rtlCol="0" anchor="ctr"/>
-            <a:lstStyle>
-              <a:lvl1pPr marL="0" indent="0">
-                <a:defRPr sz="1100">
-                  <a:solidFill>
-                    <a:schemeClr val="tx1"/>
-                  </a:solidFill>
-                  <a:latin typeface="+mn-lt"/>
-                  <a:ea typeface="+mn-ea"/>
-                  <a:cs typeface="+mn-cs"/>
-                </a:defRPr>
-              </a:lvl1pPr>
-              <a:lvl2pPr marL="457200" indent="0">
-                <a:defRPr sz="1100">
-                  <a:solidFill>
-                    <a:schemeClr val="tx1"/>
-                  </a:solidFill>
-                  <a:latin typeface="+mn-lt"/>
-                  <a:ea typeface="+mn-ea"/>
-                  <a:cs typeface="+mn-cs"/>
-                </a:defRPr>
-              </a:lvl2pPr>
-              <a:lvl3pPr marL="914400" indent="0">
-                <a:defRPr sz="1100">
-                  <a:solidFill>
-                    <a:schemeClr val="tx1"/>
-                  </a:solidFill>
-                  <a:latin typeface="+mn-lt"/>
-                  <a:ea typeface="+mn-ea"/>
-                  <a:cs typeface="+mn-cs"/>
-                </a:defRPr>
-              </a:lvl3pPr>
-              <a:lvl4pPr marL="1371600" indent="0">
-                <a:defRPr sz="1100">
-                  <a:solidFill>
-                    <a:schemeClr val="tx1"/>
-                  </a:solidFill>
-                  <a:latin typeface="+mn-lt"/>
-                  <a:ea typeface="+mn-ea"/>
-                  <a:cs typeface="+mn-cs"/>
-                </a:defRPr>
-              </a:lvl4pPr>
-              <a:lvl5pPr marL="1828800" indent="0">
-                <a:defRPr sz="1100">
-                  <a:solidFill>
-                    <a:schemeClr val="tx1"/>
-                  </a:solidFill>
-                  <a:latin typeface="+mn-lt"/>
-                  <a:ea typeface="+mn-ea"/>
-                  <a:cs typeface="+mn-cs"/>
-                </a:defRPr>
-              </a:lvl5pPr>
-              <a:lvl6pPr marL="2286000" indent="0">
-                <a:defRPr sz="1100">
-                  <a:solidFill>
-                    <a:schemeClr val="tx1"/>
-                  </a:solidFill>
-                  <a:latin typeface="+mn-lt"/>
-                  <a:ea typeface="+mn-ea"/>
-                  <a:cs typeface="+mn-cs"/>
-                </a:defRPr>
-              </a:lvl6pPr>
-              <a:lvl7pPr marL="2743200" indent="0">
-                <a:defRPr sz="1100">
-                  <a:solidFill>
-                    <a:schemeClr val="tx1"/>
-                  </a:solidFill>
-                  <a:latin typeface="+mn-lt"/>
-                  <a:ea typeface="+mn-ea"/>
-                  <a:cs typeface="+mn-cs"/>
-                </a:defRPr>
-              </a:lvl7pPr>
-              <a:lvl8pPr marL="3200400" indent="0">
-                <a:defRPr sz="1100">
-                  <a:solidFill>
-                    <a:schemeClr val="tx1"/>
-                  </a:solidFill>
-                  <a:latin typeface="+mn-lt"/>
-                  <a:ea typeface="+mn-ea"/>
-                  <a:cs typeface="+mn-cs"/>
-                </a:defRPr>
-              </a:lvl8pPr>
-              <a:lvl9pPr marL="3657600" indent="0">
-                <a:defRPr sz="1100">
-                  <a:solidFill>
-                    <a:schemeClr val="tx1"/>
-                  </a:solidFill>
-                  <a:latin typeface="+mn-lt"/>
-                  <a:ea typeface="+mn-ea"/>
-                  <a:cs typeface="+mn-cs"/>
-                </a:defRPr>
-              </a:lvl9pPr>
-            </a:lstStyle>
+            <a:lstStyle/>
             <a:p>
-              <a:pPr marL="0" indent="0" algn="ctr"/>
+              <a:pPr algn="ctr"/>
               <a:r>
-                <a:rPr lang="pt-BR" sz="1600" b="1">
+                <a:rPr lang="pt-BR" sz="1600" b="1" dirty="0">
                   <a:solidFill>
                     <a:schemeClr val="tx1">
                       <a:lumMod val="85000"/>
@@ -11740,7 +11557,6 @@
                     </a:schemeClr>
                   </a:solidFill>
                   <a:latin typeface="Arial" panose="020B0604020202020204" pitchFamily="34" charset="0"/>
-                  <a:ea typeface="+mn-ea"/>
                   <a:cs typeface="Arial" panose="020B0604020202020204" pitchFamily="34" charset="0"/>
                 </a:rPr>
                 <a:t>3. Avaliação do Produto</a:t>
@@ -11763,9 +11579,9 @@
               <a:avLst/>
             </a:prstGeom>
             <a:solidFill>
-              <a:schemeClr val="bg1">
-                <a:lumMod val="50000"/>
-                <a:alpha val="30000"/>
+              <a:schemeClr val="tx2">
+                <a:lumMod val="90000"/>
+                <a:alpha val="26000"/>
               </a:schemeClr>
             </a:solidFill>
             <a:ln w="31750" cap="flat" cmpd="sng">
@@ -11795,100 +11611,9 @@
           </p:style>
           <p:txBody>
             <a:bodyPr rtlCol="0" anchor="ctr"/>
-            <a:lstStyle>
-              <a:lvl1pPr marL="0" indent="0">
-                <a:defRPr sz="1100">
-                  <a:solidFill>
-                    <a:schemeClr val="tx1"/>
-                  </a:solidFill>
-                  <a:latin typeface="+mn-lt"/>
-                  <a:ea typeface="+mn-ea"/>
-                  <a:cs typeface="+mn-cs"/>
-                </a:defRPr>
-              </a:lvl1pPr>
-              <a:lvl2pPr marL="457200" indent="0">
-                <a:defRPr sz="1100">
-                  <a:solidFill>
-                    <a:schemeClr val="tx1"/>
-                  </a:solidFill>
-                  <a:latin typeface="+mn-lt"/>
-                  <a:ea typeface="+mn-ea"/>
-                  <a:cs typeface="+mn-cs"/>
-                </a:defRPr>
-              </a:lvl2pPr>
-              <a:lvl3pPr marL="914400" indent="0">
-                <a:defRPr sz="1100">
-                  <a:solidFill>
-                    <a:schemeClr val="tx1"/>
-                  </a:solidFill>
-                  <a:latin typeface="+mn-lt"/>
-                  <a:ea typeface="+mn-ea"/>
-                  <a:cs typeface="+mn-cs"/>
-                </a:defRPr>
-              </a:lvl3pPr>
-              <a:lvl4pPr marL="1371600" indent="0">
-                <a:defRPr sz="1100">
-                  <a:solidFill>
-                    <a:schemeClr val="tx1"/>
-                  </a:solidFill>
-                  <a:latin typeface="+mn-lt"/>
-                  <a:ea typeface="+mn-ea"/>
-                  <a:cs typeface="+mn-cs"/>
-                </a:defRPr>
-              </a:lvl4pPr>
-              <a:lvl5pPr marL="1828800" indent="0">
-                <a:defRPr sz="1100">
-                  <a:solidFill>
-                    <a:schemeClr val="tx1"/>
-                  </a:solidFill>
-                  <a:latin typeface="+mn-lt"/>
-                  <a:ea typeface="+mn-ea"/>
-                  <a:cs typeface="+mn-cs"/>
-                </a:defRPr>
-              </a:lvl5pPr>
-              <a:lvl6pPr marL="2286000" indent="0">
-                <a:defRPr sz="1100">
-                  <a:solidFill>
-                    <a:schemeClr val="tx1"/>
-                  </a:solidFill>
-                  <a:latin typeface="+mn-lt"/>
-                  <a:ea typeface="+mn-ea"/>
-                  <a:cs typeface="+mn-cs"/>
-                </a:defRPr>
-              </a:lvl6pPr>
-              <a:lvl7pPr marL="2743200" indent="0">
-                <a:defRPr sz="1100">
-                  <a:solidFill>
-                    <a:schemeClr val="tx1"/>
-                  </a:solidFill>
-                  <a:latin typeface="+mn-lt"/>
-                  <a:ea typeface="+mn-ea"/>
-                  <a:cs typeface="+mn-cs"/>
-                </a:defRPr>
-              </a:lvl7pPr>
-              <a:lvl8pPr marL="3200400" indent="0">
-                <a:defRPr sz="1100">
-                  <a:solidFill>
-                    <a:schemeClr val="tx1"/>
-                  </a:solidFill>
-                  <a:latin typeface="+mn-lt"/>
-                  <a:ea typeface="+mn-ea"/>
-                  <a:cs typeface="+mn-cs"/>
-                </a:defRPr>
-              </a:lvl8pPr>
-              <a:lvl9pPr marL="3657600" indent="0">
-                <a:defRPr sz="1100">
-                  <a:solidFill>
-                    <a:schemeClr val="tx1"/>
-                  </a:solidFill>
-                  <a:latin typeface="+mn-lt"/>
-                  <a:ea typeface="+mn-ea"/>
-                  <a:cs typeface="+mn-cs"/>
-                </a:defRPr>
-              </a:lvl9pPr>
-            </a:lstStyle>
+            <a:lstStyle/>
             <a:p>
-              <a:pPr marL="0" indent="0" algn="ctr"/>
+              <a:pPr algn="ctr"/>
               <a:r>
                 <a:rPr lang="pt-BR" sz="1600" b="1">
                   <a:solidFill>
@@ -11898,7 +11623,6 @@
                     </a:schemeClr>
                   </a:solidFill>
                   <a:latin typeface="Arial" panose="020B0604020202020204" pitchFamily="34" charset="0"/>
-                  <a:ea typeface="+mn-ea"/>
                   <a:cs typeface="Arial" panose="020B0604020202020204" pitchFamily="34" charset="0"/>
                 </a:rPr>
                 <a:t>4. Avaliação do Processo</a:t>
@@ -12011,9 +11735,9 @@
               <a:avLst/>
             </a:prstGeom>
             <a:solidFill>
-              <a:schemeClr val="bg1">
-                <a:lumMod val="50000"/>
-                <a:alpha val="30000"/>
+              <a:schemeClr val="tx2">
+                <a:lumMod val="90000"/>
+                <a:alpha val="26000"/>
               </a:schemeClr>
             </a:solidFill>
             <a:ln w="31750" cap="flat" cmpd="sng">
@@ -12043,100 +11767,9 @@
           </p:style>
           <p:txBody>
             <a:bodyPr rtlCol="0" anchor="ctr"/>
-            <a:lstStyle>
-              <a:lvl1pPr marL="0" indent="0">
-                <a:defRPr sz="1100">
-                  <a:solidFill>
-                    <a:schemeClr val="tx1"/>
-                  </a:solidFill>
-                  <a:latin typeface="+mn-lt"/>
-                  <a:ea typeface="+mn-ea"/>
-                  <a:cs typeface="+mn-cs"/>
-                </a:defRPr>
-              </a:lvl1pPr>
-              <a:lvl2pPr marL="457200" indent="0">
-                <a:defRPr sz="1100">
-                  <a:solidFill>
-                    <a:schemeClr val="tx1"/>
-                  </a:solidFill>
-                  <a:latin typeface="+mn-lt"/>
-                  <a:ea typeface="+mn-ea"/>
-                  <a:cs typeface="+mn-cs"/>
-                </a:defRPr>
-              </a:lvl2pPr>
-              <a:lvl3pPr marL="914400" indent="0">
-                <a:defRPr sz="1100">
-                  <a:solidFill>
-                    <a:schemeClr val="tx1"/>
-                  </a:solidFill>
-                  <a:latin typeface="+mn-lt"/>
-                  <a:ea typeface="+mn-ea"/>
-                  <a:cs typeface="+mn-cs"/>
-                </a:defRPr>
-              </a:lvl3pPr>
-              <a:lvl4pPr marL="1371600" indent="0">
-                <a:defRPr sz="1100">
-                  <a:solidFill>
-                    <a:schemeClr val="tx1"/>
-                  </a:solidFill>
-                  <a:latin typeface="+mn-lt"/>
-                  <a:ea typeface="+mn-ea"/>
-                  <a:cs typeface="+mn-cs"/>
-                </a:defRPr>
-              </a:lvl4pPr>
-              <a:lvl5pPr marL="1828800" indent="0">
-                <a:defRPr sz="1100">
-                  <a:solidFill>
-                    <a:schemeClr val="tx1"/>
-                  </a:solidFill>
-                  <a:latin typeface="+mn-lt"/>
-                  <a:ea typeface="+mn-ea"/>
-                  <a:cs typeface="+mn-cs"/>
-                </a:defRPr>
-              </a:lvl5pPr>
-              <a:lvl6pPr marL="2286000" indent="0">
-                <a:defRPr sz="1100">
-                  <a:solidFill>
-                    <a:schemeClr val="tx1"/>
-                  </a:solidFill>
-                  <a:latin typeface="+mn-lt"/>
-                  <a:ea typeface="+mn-ea"/>
-                  <a:cs typeface="+mn-cs"/>
-                </a:defRPr>
-              </a:lvl6pPr>
-              <a:lvl7pPr marL="2743200" indent="0">
-                <a:defRPr sz="1100">
-                  <a:solidFill>
-                    <a:schemeClr val="tx1"/>
-                  </a:solidFill>
-                  <a:latin typeface="+mn-lt"/>
-                  <a:ea typeface="+mn-ea"/>
-                  <a:cs typeface="+mn-cs"/>
-                </a:defRPr>
-              </a:lvl7pPr>
-              <a:lvl8pPr marL="3200400" indent="0">
-                <a:defRPr sz="1100">
-                  <a:solidFill>
-                    <a:schemeClr val="tx1"/>
-                  </a:solidFill>
-                  <a:latin typeface="+mn-lt"/>
-                  <a:ea typeface="+mn-ea"/>
-                  <a:cs typeface="+mn-cs"/>
-                </a:defRPr>
-              </a:lvl8pPr>
-              <a:lvl9pPr marL="3657600" indent="0">
-                <a:defRPr sz="1100">
-                  <a:solidFill>
-                    <a:schemeClr val="tx1"/>
-                  </a:solidFill>
-                  <a:latin typeface="+mn-lt"/>
-                  <a:ea typeface="+mn-ea"/>
-                  <a:cs typeface="+mn-cs"/>
-                </a:defRPr>
-              </a:lvl9pPr>
-            </a:lstStyle>
+            <a:lstStyle/>
             <a:p>
-              <a:pPr marL="0" indent="0" algn="ctr"/>
+              <a:pPr algn="ctr"/>
               <a:r>
                 <a:rPr lang="pt-BR" sz="1600" b="1">
                   <a:solidFill>
@@ -12146,7 +11779,6 @@
                     </a:schemeClr>
                   </a:solidFill>
                   <a:latin typeface="Arial" panose="020B0604020202020204" pitchFamily="34" charset="0"/>
-                  <a:ea typeface="+mn-ea"/>
                   <a:cs typeface="Arial" panose="020B0604020202020204" pitchFamily="34" charset="0"/>
                 </a:rPr>
                 <a:t>5. Relatório de não conformidades</a:t>
@@ -12259,9 +11891,9 @@
               <a:avLst/>
             </a:prstGeom>
             <a:solidFill>
-              <a:schemeClr val="bg1">
-                <a:lumMod val="50000"/>
-                <a:alpha val="30000"/>
+              <a:schemeClr val="tx2">
+                <a:lumMod val="90000"/>
+                <a:alpha val="26000"/>
               </a:schemeClr>
             </a:solidFill>
             <a:ln w="31750" cap="flat" cmpd="sng">
@@ -12291,100 +11923,9 @@
           </p:style>
           <p:txBody>
             <a:bodyPr rtlCol="0" anchor="ctr"/>
-            <a:lstStyle>
-              <a:lvl1pPr marL="0" indent="0">
-                <a:defRPr sz="1100">
-                  <a:solidFill>
-                    <a:schemeClr val="tx1"/>
-                  </a:solidFill>
-                  <a:latin typeface="+mn-lt"/>
-                  <a:ea typeface="+mn-ea"/>
-                  <a:cs typeface="+mn-cs"/>
-                </a:defRPr>
-              </a:lvl1pPr>
-              <a:lvl2pPr marL="457200" indent="0">
-                <a:defRPr sz="1100">
-                  <a:solidFill>
-                    <a:schemeClr val="tx1"/>
-                  </a:solidFill>
-                  <a:latin typeface="+mn-lt"/>
-                  <a:ea typeface="+mn-ea"/>
-                  <a:cs typeface="+mn-cs"/>
-                </a:defRPr>
-              </a:lvl2pPr>
-              <a:lvl3pPr marL="914400" indent="0">
-                <a:defRPr sz="1100">
-                  <a:solidFill>
-                    <a:schemeClr val="tx1"/>
-                  </a:solidFill>
-                  <a:latin typeface="+mn-lt"/>
-                  <a:ea typeface="+mn-ea"/>
-                  <a:cs typeface="+mn-cs"/>
-                </a:defRPr>
-              </a:lvl3pPr>
-              <a:lvl4pPr marL="1371600" indent="0">
-                <a:defRPr sz="1100">
-                  <a:solidFill>
-                    <a:schemeClr val="tx1"/>
-                  </a:solidFill>
-                  <a:latin typeface="+mn-lt"/>
-                  <a:ea typeface="+mn-ea"/>
-                  <a:cs typeface="+mn-cs"/>
-                </a:defRPr>
-              </a:lvl4pPr>
-              <a:lvl5pPr marL="1828800" indent="0">
-                <a:defRPr sz="1100">
-                  <a:solidFill>
-                    <a:schemeClr val="tx1"/>
-                  </a:solidFill>
-                  <a:latin typeface="+mn-lt"/>
-                  <a:ea typeface="+mn-ea"/>
-                  <a:cs typeface="+mn-cs"/>
-                </a:defRPr>
-              </a:lvl5pPr>
-              <a:lvl6pPr marL="2286000" indent="0">
-                <a:defRPr sz="1100">
-                  <a:solidFill>
-                    <a:schemeClr val="tx1"/>
-                  </a:solidFill>
-                  <a:latin typeface="+mn-lt"/>
-                  <a:ea typeface="+mn-ea"/>
-                  <a:cs typeface="+mn-cs"/>
-                </a:defRPr>
-              </a:lvl6pPr>
-              <a:lvl7pPr marL="2743200" indent="0">
-                <a:defRPr sz="1100">
-                  <a:solidFill>
-                    <a:schemeClr val="tx1"/>
-                  </a:solidFill>
-                  <a:latin typeface="+mn-lt"/>
-                  <a:ea typeface="+mn-ea"/>
-                  <a:cs typeface="+mn-cs"/>
-                </a:defRPr>
-              </a:lvl7pPr>
-              <a:lvl8pPr marL="3200400" indent="0">
-                <a:defRPr sz="1100">
-                  <a:solidFill>
-                    <a:schemeClr val="tx1"/>
-                  </a:solidFill>
-                  <a:latin typeface="+mn-lt"/>
-                  <a:ea typeface="+mn-ea"/>
-                  <a:cs typeface="+mn-cs"/>
-                </a:defRPr>
-              </a:lvl8pPr>
-              <a:lvl9pPr marL="3657600" indent="0">
-                <a:defRPr sz="1100">
-                  <a:solidFill>
-                    <a:schemeClr val="tx1"/>
-                  </a:solidFill>
-                  <a:latin typeface="+mn-lt"/>
-                  <a:ea typeface="+mn-ea"/>
-                  <a:cs typeface="+mn-cs"/>
-                </a:defRPr>
-              </a:lvl9pPr>
-            </a:lstStyle>
+            <a:lstStyle/>
             <a:p>
-              <a:pPr marL="0" indent="0" algn="ctr"/>
+              <a:pPr algn="ctr"/>
               <a:r>
                 <a:rPr lang="pt-BR" sz="1600" b="1">
                   <a:solidFill>
@@ -12394,7 +11935,6 @@
                     </a:schemeClr>
                   </a:solidFill>
                   <a:latin typeface="Arial" panose="020B0604020202020204" pitchFamily="34" charset="0"/>
-                  <a:ea typeface="+mn-ea"/>
                   <a:cs typeface="Arial" panose="020B0604020202020204" pitchFamily="34" charset="0"/>
                 </a:rPr>
                 <a:t>7. Aprovar produto final</a:t>
@@ -12460,9 +12000,9 @@
               <a:avLst/>
             </a:prstGeom>
             <a:solidFill>
-              <a:schemeClr val="bg1">
-                <a:lumMod val="50000"/>
-                <a:alpha val="30000"/>
+              <a:schemeClr val="tx2">
+                <a:lumMod val="90000"/>
+                <a:alpha val="26000"/>
               </a:schemeClr>
             </a:solidFill>
             <a:ln w="31750" cap="flat" cmpd="sng">
@@ -12492,100 +12032,9 @@
           </p:style>
           <p:txBody>
             <a:bodyPr rtlCol="0" anchor="ctr"/>
-            <a:lstStyle>
-              <a:lvl1pPr marL="0" indent="0">
-                <a:defRPr sz="1100">
-                  <a:solidFill>
-                    <a:schemeClr val="tx1"/>
-                  </a:solidFill>
-                  <a:latin typeface="+mn-lt"/>
-                  <a:ea typeface="+mn-ea"/>
-                  <a:cs typeface="+mn-cs"/>
-                </a:defRPr>
-              </a:lvl1pPr>
-              <a:lvl2pPr marL="457200" indent="0">
-                <a:defRPr sz="1100">
-                  <a:solidFill>
-                    <a:schemeClr val="tx1"/>
-                  </a:solidFill>
-                  <a:latin typeface="+mn-lt"/>
-                  <a:ea typeface="+mn-ea"/>
-                  <a:cs typeface="+mn-cs"/>
-                </a:defRPr>
-              </a:lvl2pPr>
-              <a:lvl3pPr marL="914400" indent="0">
-                <a:defRPr sz="1100">
-                  <a:solidFill>
-                    <a:schemeClr val="tx1"/>
-                  </a:solidFill>
-                  <a:latin typeface="+mn-lt"/>
-                  <a:ea typeface="+mn-ea"/>
-                  <a:cs typeface="+mn-cs"/>
-                </a:defRPr>
-              </a:lvl3pPr>
-              <a:lvl4pPr marL="1371600" indent="0">
-                <a:defRPr sz="1100">
-                  <a:solidFill>
-                    <a:schemeClr val="tx1"/>
-                  </a:solidFill>
-                  <a:latin typeface="+mn-lt"/>
-                  <a:ea typeface="+mn-ea"/>
-                  <a:cs typeface="+mn-cs"/>
-                </a:defRPr>
-              </a:lvl4pPr>
-              <a:lvl5pPr marL="1828800" indent="0">
-                <a:defRPr sz="1100">
-                  <a:solidFill>
-                    <a:schemeClr val="tx1"/>
-                  </a:solidFill>
-                  <a:latin typeface="+mn-lt"/>
-                  <a:ea typeface="+mn-ea"/>
-                  <a:cs typeface="+mn-cs"/>
-                </a:defRPr>
-              </a:lvl5pPr>
-              <a:lvl6pPr marL="2286000" indent="0">
-                <a:defRPr sz="1100">
-                  <a:solidFill>
-                    <a:schemeClr val="tx1"/>
-                  </a:solidFill>
-                  <a:latin typeface="+mn-lt"/>
-                  <a:ea typeface="+mn-ea"/>
-                  <a:cs typeface="+mn-cs"/>
-                </a:defRPr>
-              </a:lvl6pPr>
-              <a:lvl7pPr marL="2743200" indent="0">
-                <a:defRPr sz="1100">
-                  <a:solidFill>
-                    <a:schemeClr val="tx1"/>
-                  </a:solidFill>
-                  <a:latin typeface="+mn-lt"/>
-                  <a:ea typeface="+mn-ea"/>
-                  <a:cs typeface="+mn-cs"/>
-                </a:defRPr>
-              </a:lvl7pPr>
-              <a:lvl8pPr marL="3200400" indent="0">
-                <a:defRPr sz="1100">
-                  <a:solidFill>
-                    <a:schemeClr val="tx1"/>
-                  </a:solidFill>
-                  <a:latin typeface="+mn-lt"/>
-                  <a:ea typeface="+mn-ea"/>
-                  <a:cs typeface="+mn-cs"/>
-                </a:defRPr>
-              </a:lvl8pPr>
-              <a:lvl9pPr marL="3657600" indent="0">
-                <a:defRPr sz="1100">
-                  <a:solidFill>
-                    <a:schemeClr val="tx1"/>
-                  </a:solidFill>
-                  <a:latin typeface="+mn-lt"/>
-                  <a:ea typeface="+mn-ea"/>
-                  <a:cs typeface="+mn-cs"/>
-                </a:defRPr>
-              </a:lvl9pPr>
-            </a:lstStyle>
+            <a:lstStyle/>
             <a:p>
-              <a:pPr marL="0" indent="0" algn="ctr"/>
+              <a:pPr algn="ctr"/>
               <a:r>
                 <a:rPr lang="pt-BR" sz="1600" b="1">
                   <a:solidFill>
@@ -12595,7 +12044,6 @@
                     </a:schemeClr>
                   </a:solidFill>
                   <a:latin typeface="Arial" panose="020B0604020202020204" pitchFamily="34" charset="0"/>
-                  <a:ea typeface="+mn-ea"/>
                   <a:cs typeface="Arial" panose="020B0604020202020204" pitchFamily="34" charset="0"/>
                 </a:rPr>
                 <a:t>6. Relatório periódico</a:t>
@@ -12663,9 +12111,9 @@
               <a:avLst/>
             </a:prstGeom>
             <a:solidFill>
-              <a:schemeClr val="bg1">
-                <a:lumMod val="50000"/>
-                <a:alpha val="30000"/>
+              <a:schemeClr val="tx2">
+                <a:lumMod val="90000"/>
+                <a:alpha val="26000"/>
               </a:schemeClr>
             </a:solidFill>
             <a:ln w="31750" cap="flat" cmpd="sng">
@@ -12695,100 +12143,9 @@
           </p:style>
           <p:txBody>
             <a:bodyPr rtlCol="0" anchor="ctr"/>
-            <a:lstStyle>
-              <a:lvl1pPr marL="0" indent="0">
-                <a:defRPr sz="1100">
-                  <a:solidFill>
-                    <a:schemeClr val="tx1"/>
-                  </a:solidFill>
-                  <a:latin typeface="+mn-lt"/>
-                  <a:ea typeface="+mn-ea"/>
-                  <a:cs typeface="+mn-cs"/>
-                </a:defRPr>
-              </a:lvl1pPr>
-              <a:lvl2pPr marL="457200" indent="0">
-                <a:defRPr sz="1100">
-                  <a:solidFill>
-                    <a:schemeClr val="tx1"/>
-                  </a:solidFill>
-                  <a:latin typeface="+mn-lt"/>
-                  <a:ea typeface="+mn-ea"/>
-                  <a:cs typeface="+mn-cs"/>
-                </a:defRPr>
-              </a:lvl2pPr>
-              <a:lvl3pPr marL="914400" indent="0">
-                <a:defRPr sz="1100">
-                  <a:solidFill>
-                    <a:schemeClr val="tx1"/>
-                  </a:solidFill>
-                  <a:latin typeface="+mn-lt"/>
-                  <a:ea typeface="+mn-ea"/>
-                  <a:cs typeface="+mn-cs"/>
-                </a:defRPr>
-              </a:lvl3pPr>
-              <a:lvl4pPr marL="1371600" indent="0">
-                <a:defRPr sz="1100">
-                  <a:solidFill>
-                    <a:schemeClr val="tx1"/>
-                  </a:solidFill>
-                  <a:latin typeface="+mn-lt"/>
-                  <a:ea typeface="+mn-ea"/>
-                  <a:cs typeface="+mn-cs"/>
-                </a:defRPr>
-              </a:lvl4pPr>
-              <a:lvl5pPr marL="1828800" indent="0">
-                <a:defRPr sz="1100">
-                  <a:solidFill>
-                    <a:schemeClr val="tx1"/>
-                  </a:solidFill>
-                  <a:latin typeface="+mn-lt"/>
-                  <a:ea typeface="+mn-ea"/>
-                  <a:cs typeface="+mn-cs"/>
-                </a:defRPr>
-              </a:lvl5pPr>
-              <a:lvl6pPr marL="2286000" indent="0">
-                <a:defRPr sz="1100">
-                  <a:solidFill>
-                    <a:schemeClr val="tx1"/>
-                  </a:solidFill>
-                  <a:latin typeface="+mn-lt"/>
-                  <a:ea typeface="+mn-ea"/>
-                  <a:cs typeface="+mn-cs"/>
-                </a:defRPr>
-              </a:lvl6pPr>
-              <a:lvl7pPr marL="2743200" indent="0">
-                <a:defRPr sz="1100">
-                  <a:solidFill>
-                    <a:schemeClr val="tx1"/>
-                  </a:solidFill>
-                  <a:latin typeface="+mn-lt"/>
-                  <a:ea typeface="+mn-ea"/>
-                  <a:cs typeface="+mn-cs"/>
-                </a:defRPr>
-              </a:lvl7pPr>
-              <a:lvl8pPr marL="3200400" indent="0">
-                <a:defRPr sz="1100">
-                  <a:solidFill>
-                    <a:schemeClr val="tx1"/>
-                  </a:solidFill>
-                  <a:latin typeface="+mn-lt"/>
-                  <a:ea typeface="+mn-ea"/>
-                  <a:cs typeface="+mn-cs"/>
-                </a:defRPr>
-              </a:lvl8pPr>
-              <a:lvl9pPr marL="3657600" indent="0">
-                <a:defRPr sz="1100">
-                  <a:solidFill>
-                    <a:schemeClr val="tx1"/>
-                  </a:solidFill>
-                  <a:latin typeface="+mn-lt"/>
-                  <a:ea typeface="+mn-ea"/>
-                  <a:cs typeface="+mn-cs"/>
-                </a:defRPr>
-              </a:lvl9pPr>
-            </a:lstStyle>
+            <a:lstStyle/>
             <a:p>
-              <a:pPr marL="0" indent="0" algn="ctr"/>
+              <a:pPr algn="ctr"/>
               <a:r>
                 <a:rPr lang="pt-BR" sz="1600" b="1">
                   <a:solidFill>
@@ -12798,7 +12155,6 @@
                     </a:schemeClr>
                   </a:solidFill>
                   <a:latin typeface="Arial" panose="020B0604020202020204" pitchFamily="34" charset="0"/>
-                  <a:ea typeface="+mn-ea"/>
                   <a:cs typeface="Arial" panose="020B0604020202020204" pitchFamily="34" charset="0"/>
                 </a:rPr>
                 <a:t>8. Relatório de lições aprendidas</a:t>
@@ -12909,9 +12265,9 @@
               <a:avLst/>
             </a:prstGeom>
             <a:solidFill>
-              <a:schemeClr val="bg1">
-                <a:lumMod val="50000"/>
-                <a:alpha val="30000"/>
+              <a:schemeClr val="tx2">
+                <a:lumMod val="90000"/>
+                <a:alpha val="26000"/>
               </a:schemeClr>
             </a:solidFill>
             <a:ln w="31750" cap="flat" cmpd="sng">
@@ -12941,100 +12297,9 @@
           </p:style>
           <p:txBody>
             <a:bodyPr rtlCol="0" anchor="ctr"/>
-            <a:lstStyle>
-              <a:lvl1pPr marL="0" indent="0">
-                <a:defRPr sz="1100">
-                  <a:solidFill>
-                    <a:schemeClr val="tx1"/>
-                  </a:solidFill>
-                  <a:latin typeface="+mn-lt"/>
-                  <a:ea typeface="+mn-ea"/>
-                  <a:cs typeface="+mn-cs"/>
-                </a:defRPr>
-              </a:lvl1pPr>
-              <a:lvl2pPr marL="457200" indent="0">
-                <a:defRPr sz="1100">
-                  <a:solidFill>
-                    <a:schemeClr val="tx1"/>
-                  </a:solidFill>
-                  <a:latin typeface="+mn-lt"/>
-                  <a:ea typeface="+mn-ea"/>
-                  <a:cs typeface="+mn-cs"/>
-                </a:defRPr>
-              </a:lvl2pPr>
-              <a:lvl3pPr marL="914400" indent="0">
-                <a:defRPr sz="1100">
-                  <a:solidFill>
-                    <a:schemeClr val="tx1"/>
-                  </a:solidFill>
-                  <a:latin typeface="+mn-lt"/>
-                  <a:ea typeface="+mn-ea"/>
-                  <a:cs typeface="+mn-cs"/>
-                </a:defRPr>
-              </a:lvl3pPr>
-              <a:lvl4pPr marL="1371600" indent="0">
-                <a:defRPr sz="1100">
-                  <a:solidFill>
-                    <a:schemeClr val="tx1"/>
-                  </a:solidFill>
-                  <a:latin typeface="+mn-lt"/>
-                  <a:ea typeface="+mn-ea"/>
-                  <a:cs typeface="+mn-cs"/>
-                </a:defRPr>
-              </a:lvl4pPr>
-              <a:lvl5pPr marL="1828800" indent="0">
-                <a:defRPr sz="1100">
-                  <a:solidFill>
-                    <a:schemeClr val="tx1"/>
-                  </a:solidFill>
-                  <a:latin typeface="+mn-lt"/>
-                  <a:ea typeface="+mn-ea"/>
-                  <a:cs typeface="+mn-cs"/>
-                </a:defRPr>
-              </a:lvl5pPr>
-              <a:lvl6pPr marL="2286000" indent="0">
-                <a:defRPr sz="1100">
-                  <a:solidFill>
-                    <a:schemeClr val="tx1"/>
-                  </a:solidFill>
-                  <a:latin typeface="+mn-lt"/>
-                  <a:ea typeface="+mn-ea"/>
-                  <a:cs typeface="+mn-cs"/>
-                </a:defRPr>
-              </a:lvl6pPr>
-              <a:lvl7pPr marL="2743200" indent="0">
-                <a:defRPr sz="1100">
-                  <a:solidFill>
-                    <a:schemeClr val="tx1"/>
-                  </a:solidFill>
-                  <a:latin typeface="+mn-lt"/>
-                  <a:ea typeface="+mn-ea"/>
-                  <a:cs typeface="+mn-cs"/>
-                </a:defRPr>
-              </a:lvl7pPr>
-              <a:lvl8pPr marL="3200400" indent="0">
-                <a:defRPr sz="1100">
-                  <a:solidFill>
-                    <a:schemeClr val="tx1"/>
-                  </a:solidFill>
-                  <a:latin typeface="+mn-lt"/>
-                  <a:ea typeface="+mn-ea"/>
-                  <a:cs typeface="+mn-cs"/>
-                </a:defRPr>
-              </a:lvl8pPr>
-              <a:lvl9pPr marL="3657600" indent="0">
-                <a:defRPr sz="1100">
-                  <a:solidFill>
-                    <a:schemeClr val="tx1"/>
-                  </a:solidFill>
-                  <a:latin typeface="+mn-lt"/>
-                  <a:ea typeface="+mn-ea"/>
-                  <a:cs typeface="+mn-cs"/>
-                </a:defRPr>
-              </a:lvl9pPr>
-            </a:lstStyle>
+            <a:lstStyle/>
             <a:p>
-              <a:pPr marL="0" indent="0" algn="ctr"/>
+              <a:pPr algn="ctr"/>
               <a:r>
                 <a:rPr lang="pt-BR" sz="1600" b="1">
                   <a:solidFill>
@@ -13044,7 +12309,6 @@
                     </a:schemeClr>
                   </a:solidFill>
                   <a:latin typeface="Arial" panose="020B0604020202020204" pitchFamily="34" charset="0"/>
-                  <a:ea typeface="+mn-ea"/>
                   <a:cs typeface="Arial" panose="020B0604020202020204" pitchFamily="34" charset="0"/>
                 </a:rPr>
                 <a:t>9. Suporte aos envolvidos no Projeto</a:t>
@@ -14790,10 +14054,10 @@
         </p:nvGrpSpPr>
         <p:grpSpPr>
           <a:xfrm>
-            <a:off x="2195737" y="2708920"/>
-            <a:ext cx="6480720" cy="3672408"/>
-            <a:chOff x="0" y="0"/>
-            <a:chExt cx="6627999" cy="4610100"/>
+            <a:off x="2134205" y="2708920"/>
+            <a:ext cx="6542252" cy="3672408"/>
+            <a:chOff x="-62930" y="0"/>
+            <a:chExt cx="6690929" cy="4610100"/>
           </a:xfrm>
         </p:grpSpPr>
         <p:sp>
@@ -14952,10 +14216,10 @@
           </p:nvGrpSpPr>
           <p:grpSpPr>
             <a:xfrm>
-              <a:off x="18910" y="0"/>
-              <a:ext cx="6609089" cy="4610100"/>
-              <a:chOff x="18910" y="0"/>
-              <a:chExt cx="6609089" cy="4610100"/>
+              <a:off x="-62930" y="0"/>
+              <a:ext cx="6690929" cy="4610100"/>
+              <a:chOff x="-62930" y="0"/>
+              <a:chExt cx="6690929" cy="4610100"/>
             </a:xfrm>
           </p:grpSpPr>
           <p:cxnSp>
@@ -15152,7 +14416,7 @@
             </p:nvSpPr>
             <p:spPr>
               <a:xfrm>
-                <a:off x="104006" y="514349"/>
+                <a:off x="-62930" y="451971"/>
                 <a:ext cx="3082351" cy="1228726"/>
               </a:xfrm>
               <a:prstGeom prst="rect">
@@ -15277,7 +14541,7 @@
               </a:lstStyle>
               <a:p>
                 <a:r>
-                  <a:rPr lang="pt-BR" sz="1400" b="1">
+                  <a:rPr lang="pt-BR" sz="1400" b="1" dirty="0">
                     <a:solidFill>
                       <a:schemeClr val="tx1">
                         <a:lumMod val="75000"/>
@@ -15289,7 +14553,7 @@
                   </a:rPr>
                   <a:t>Capacidade:</a:t>
                 </a:r>
-                <a:endParaRPr lang="pt-BR" sz="1400" b="1" baseline="0">
+                <a:endParaRPr lang="pt-BR" sz="1400" b="1" baseline="0" dirty="0">
                   <a:solidFill>
                     <a:schemeClr val="tx1">
                       <a:lumMod val="75000"/>
@@ -15302,7 +14566,7 @@
               </a:p>
               <a:p>
                 <a:r>
-                  <a:rPr lang="pt-BR" sz="2000" b="1" baseline="0">
+                  <a:rPr lang="pt-BR" sz="2000" b="1" baseline="0" dirty="0">
                     <a:solidFill>
                       <a:schemeClr val="tx1">
                         <a:lumMod val="75000"/>
@@ -15315,7 +14579,7 @@
                   <a:t>Manutenção </a:t>
                 </a:r>
                 <a:r>
-                  <a:rPr lang="pt-BR" sz="1400" b="1" baseline="0">
+                  <a:rPr lang="pt-BR" sz="1400" b="1" baseline="0" dirty="0">
                     <a:solidFill>
                       <a:schemeClr val="tx1">
                         <a:lumMod val="75000"/>
@@ -15330,7 +14594,7 @@
               </a:p>
               <a:p>
                 <a:r>
-                  <a:rPr lang="pt-BR" sz="1400" b="1" baseline="0">
+                  <a:rPr lang="pt-BR" sz="1400" b="1" baseline="0" dirty="0">
                     <a:solidFill>
                       <a:schemeClr val="tx1">
                         <a:lumMod val="75000"/>
@@ -15342,7 +14606,7 @@
                   </a:rPr>
                   <a:t>Flexibilidade</a:t>
                 </a:r>
-                <a:endParaRPr lang="pt-BR" sz="1400" b="1">
+                <a:endParaRPr lang="pt-BR" sz="1400" b="1" dirty="0">
                   <a:solidFill>
                     <a:schemeClr val="tx1">
                       <a:lumMod val="75000"/>
@@ -16096,8 +15360,8 @@
               <a:avLst/>
             </a:prstGeom>
             <a:solidFill>
-              <a:schemeClr val="bg1">
-                <a:lumMod val="75000"/>
+              <a:schemeClr val="tx1">
+                <a:lumMod val="85000"/>
                 <a:alpha val="50000"/>
               </a:schemeClr>
             </a:solidFill>
@@ -16130,100 +15394,9 @@
           </p:style>
           <p:txBody>
             <a:bodyPr rtlCol="0" anchor="ctr"/>
-            <a:lstStyle>
-              <a:lvl1pPr marL="0" indent="0">
-                <a:defRPr sz="1100">
-                  <a:solidFill>
-                    <a:schemeClr val="lt1"/>
-                  </a:solidFill>
-                  <a:latin typeface="+mn-lt"/>
-                  <a:ea typeface="+mn-ea"/>
-                  <a:cs typeface="+mn-cs"/>
-                </a:defRPr>
-              </a:lvl1pPr>
-              <a:lvl2pPr marL="457200" indent="0">
-                <a:defRPr sz="1100">
-                  <a:solidFill>
-                    <a:schemeClr val="lt1"/>
-                  </a:solidFill>
-                  <a:latin typeface="+mn-lt"/>
-                  <a:ea typeface="+mn-ea"/>
-                  <a:cs typeface="+mn-cs"/>
-                </a:defRPr>
-              </a:lvl2pPr>
-              <a:lvl3pPr marL="914400" indent="0">
-                <a:defRPr sz="1100">
-                  <a:solidFill>
-                    <a:schemeClr val="lt1"/>
-                  </a:solidFill>
-                  <a:latin typeface="+mn-lt"/>
-                  <a:ea typeface="+mn-ea"/>
-                  <a:cs typeface="+mn-cs"/>
-                </a:defRPr>
-              </a:lvl3pPr>
-              <a:lvl4pPr marL="1371600" indent="0">
-                <a:defRPr sz="1100">
-                  <a:solidFill>
-                    <a:schemeClr val="lt1"/>
-                  </a:solidFill>
-                  <a:latin typeface="+mn-lt"/>
-                  <a:ea typeface="+mn-ea"/>
-                  <a:cs typeface="+mn-cs"/>
-                </a:defRPr>
-              </a:lvl4pPr>
-              <a:lvl5pPr marL="1828800" indent="0">
-                <a:defRPr sz="1100">
-                  <a:solidFill>
-                    <a:schemeClr val="lt1"/>
-                  </a:solidFill>
-                  <a:latin typeface="+mn-lt"/>
-                  <a:ea typeface="+mn-ea"/>
-                  <a:cs typeface="+mn-cs"/>
-                </a:defRPr>
-              </a:lvl5pPr>
-              <a:lvl6pPr marL="2286000" indent="0">
-                <a:defRPr sz="1100">
-                  <a:solidFill>
-                    <a:schemeClr val="lt1"/>
-                  </a:solidFill>
-                  <a:latin typeface="+mn-lt"/>
-                  <a:ea typeface="+mn-ea"/>
-                  <a:cs typeface="+mn-cs"/>
-                </a:defRPr>
-              </a:lvl6pPr>
-              <a:lvl7pPr marL="2743200" indent="0">
-                <a:defRPr sz="1100">
-                  <a:solidFill>
-                    <a:schemeClr val="lt1"/>
-                  </a:solidFill>
-                  <a:latin typeface="+mn-lt"/>
-                  <a:ea typeface="+mn-ea"/>
-                  <a:cs typeface="+mn-cs"/>
-                </a:defRPr>
-              </a:lvl7pPr>
-              <a:lvl8pPr marL="3200400" indent="0">
-                <a:defRPr sz="1100">
-                  <a:solidFill>
-                    <a:schemeClr val="lt1"/>
-                  </a:solidFill>
-                  <a:latin typeface="+mn-lt"/>
-                  <a:ea typeface="+mn-ea"/>
-                  <a:cs typeface="+mn-cs"/>
-                </a:defRPr>
-              </a:lvl8pPr>
-              <a:lvl9pPr marL="3657600" indent="0">
-                <a:defRPr sz="1100">
-                  <a:solidFill>
-                    <a:schemeClr val="lt1"/>
-                  </a:solidFill>
-                  <a:latin typeface="+mn-lt"/>
-                  <a:ea typeface="+mn-ea"/>
-                  <a:cs typeface="+mn-cs"/>
-                </a:defRPr>
-              </a:lvl9pPr>
-            </a:lstStyle>
+            <a:lstStyle/>
             <a:p>
-              <a:pPr marL="0" indent="0" algn="ctr"/>
+              <a:pPr algn="ctr"/>
               <a:r>
                 <a:rPr lang="pt-BR" sz="1400">
                   <a:solidFill>
@@ -16233,7 +15406,6 @@
                     </a:schemeClr>
                   </a:solidFill>
                   <a:latin typeface="Arial" pitchFamily="34" charset="0"/>
-                  <a:ea typeface="+mn-ea"/>
                   <a:cs typeface="Arial" pitchFamily="34" charset="0"/>
                 </a:rPr>
                 <a:t>PORTABILIDADE</a:t>
@@ -16450,8 +15622,8 @@
                 <a:avLst/>
               </a:prstGeom>
               <a:solidFill>
-                <a:schemeClr val="bg1">
-                  <a:lumMod val="75000"/>
+                <a:schemeClr val="tx1">
+                  <a:lumMod val="85000"/>
                   <a:alpha val="50000"/>
                 </a:schemeClr>
               </a:solidFill>
@@ -16484,98 +15656,7 @@
             </p:style>
             <p:txBody>
               <a:bodyPr rtlCol="0" anchor="ctr"/>
-              <a:lstStyle>
-                <a:lvl1pPr marL="0" indent="0">
-                  <a:defRPr sz="1100">
-                    <a:solidFill>
-                      <a:schemeClr val="lt1"/>
-                    </a:solidFill>
-                    <a:latin typeface="+mn-lt"/>
-                    <a:ea typeface="+mn-ea"/>
-                    <a:cs typeface="+mn-cs"/>
-                  </a:defRPr>
-                </a:lvl1pPr>
-                <a:lvl2pPr marL="457200" indent="0">
-                  <a:defRPr sz="1100">
-                    <a:solidFill>
-                      <a:schemeClr val="lt1"/>
-                    </a:solidFill>
-                    <a:latin typeface="+mn-lt"/>
-                    <a:ea typeface="+mn-ea"/>
-                    <a:cs typeface="+mn-cs"/>
-                  </a:defRPr>
-                </a:lvl2pPr>
-                <a:lvl3pPr marL="914400" indent="0">
-                  <a:defRPr sz="1100">
-                    <a:solidFill>
-                      <a:schemeClr val="lt1"/>
-                    </a:solidFill>
-                    <a:latin typeface="+mn-lt"/>
-                    <a:ea typeface="+mn-ea"/>
-                    <a:cs typeface="+mn-cs"/>
-                  </a:defRPr>
-                </a:lvl3pPr>
-                <a:lvl4pPr marL="1371600" indent="0">
-                  <a:defRPr sz="1100">
-                    <a:solidFill>
-                      <a:schemeClr val="lt1"/>
-                    </a:solidFill>
-                    <a:latin typeface="+mn-lt"/>
-                    <a:ea typeface="+mn-ea"/>
-                    <a:cs typeface="+mn-cs"/>
-                  </a:defRPr>
-                </a:lvl4pPr>
-                <a:lvl5pPr marL="1828800" indent="0">
-                  <a:defRPr sz="1100">
-                    <a:solidFill>
-                      <a:schemeClr val="lt1"/>
-                    </a:solidFill>
-                    <a:latin typeface="+mn-lt"/>
-                    <a:ea typeface="+mn-ea"/>
-                    <a:cs typeface="+mn-cs"/>
-                  </a:defRPr>
-                </a:lvl5pPr>
-                <a:lvl6pPr marL="2286000" indent="0">
-                  <a:defRPr sz="1100">
-                    <a:solidFill>
-                      <a:schemeClr val="lt1"/>
-                    </a:solidFill>
-                    <a:latin typeface="+mn-lt"/>
-                    <a:ea typeface="+mn-ea"/>
-                    <a:cs typeface="+mn-cs"/>
-                  </a:defRPr>
-                </a:lvl6pPr>
-                <a:lvl7pPr marL="2743200" indent="0">
-                  <a:defRPr sz="1100">
-                    <a:solidFill>
-                      <a:schemeClr val="lt1"/>
-                    </a:solidFill>
-                    <a:latin typeface="+mn-lt"/>
-                    <a:ea typeface="+mn-ea"/>
-                    <a:cs typeface="+mn-cs"/>
-                  </a:defRPr>
-                </a:lvl7pPr>
-                <a:lvl8pPr marL="3200400" indent="0">
-                  <a:defRPr sz="1100">
-                    <a:solidFill>
-                      <a:schemeClr val="lt1"/>
-                    </a:solidFill>
-                    <a:latin typeface="+mn-lt"/>
-                    <a:ea typeface="+mn-ea"/>
-                    <a:cs typeface="+mn-cs"/>
-                  </a:defRPr>
-                </a:lvl8pPr>
-                <a:lvl9pPr marL="3657600" indent="0">
-                  <a:defRPr sz="1100">
-                    <a:solidFill>
-                      <a:schemeClr val="lt1"/>
-                    </a:solidFill>
-                    <a:latin typeface="+mn-lt"/>
-                    <a:ea typeface="+mn-ea"/>
-                    <a:cs typeface="+mn-cs"/>
-                  </a:defRPr>
-                </a:lvl9pPr>
-              </a:lstStyle>
+              <a:lstStyle/>
               <a:p>
                 <a:pPr algn="ctr"/>
                 <a:r>
@@ -16609,8 +15690,8 @@
                 <a:avLst/>
               </a:prstGeom>
               <a:solidFill>
-                <a:schemeClr val="bg1">
-                  <a:lumMod val="75000"/>
+                <a:schemeClr val="tx1">
+                  <a:lumMod val="85000"/>
                   <a:alpha val="50000"/>
                 </a:schemeClr>
               </a:solidFill>
@@ -16643,100 +15724,9 @@
             </p:style>
             <p:txBody>
               <a:bodyPr rtlCol="0" anchor="ctr"/>
-              <a:lstStyle>
-                <a:lvl1pPr marL="0" indent="0">
-                  <a:defRPr sz="1100">
-                    <a:solidFill>
-                      <a:schemeClr val="lt1"/>
-                    </a:solidFill>
-                    <a:latin typeface="+mn-lt"/>
-                    <a:ea typeface="+mn-ea"/>
-                    <a:cs typeface="+mn-cs"/>
-                  </a:defRPr>
-                </a:lvl1pPr>
-                <a:lvl2pPr marL="457200" indent="0">
-                  <a:defRPr sz="1100">
-                    <a:solidFill>
-                      <a:schemeClr val="lt1"/>
-                    </a:solidFill>
-                    <a:latin typeface="+mn-lt"/>
-                    <a:ea typeface="+mn-ea"/>
-                    <a:cs typeface="+mn-cs"/>
-                  </a:defRPr>
-                </a:lvl2pPr>
-                <a:lvl3pPr marL="914400" indent="0">
-                  <a:defRPr sz="1100">
-                    <a:solidFill>
-                      <a:schemeClr val="lt1"/>
-                    </a:solidFill>
-                    <a:latin typeface="+mn-lt"/>
-                    <a:ea typeface="+mn-ea"/>
-                    <a:cs typeface="+mn-cs"/>
-                  </a:defRPr>
-                </a:lvl3pPr>
-                <a:lvl4pPr marL="1371600" indent="0">
-                  <a:defRPr sz="1100">
-                    <a:solidFill>
-                      <a:schemeClr val="lt1"/>
-                    </a:solidFill>
-                    <a:latin typeface="+mn-lt"/>
-                    <a:ea typeface="+mn-ea"/>
-                    <a:cs typeface="+mn-cs"/>
-                  </a:defRPr>
-                </a:lvl4pPr>
-                <a:lvl5pPr marL="1828800" indent="0">
-                  <a:defRPr sz="1100">
-                    <a:solidFill>
-                      <a:schemeClr val="lt1"/>
-                    </a:solidFill>
-                    <a:latin typeface="+mn-lt"/>
-                    <a:ea typeface="+mn-ea"/>
-                    <a:cs typeface="+mn-cs"/>
-                  </a:defRPr>
-                </a:lvl5pPr>
-                <a:lvl6pPr marL="2286000" indent="0">
-                  <a:defRPr sz="1100">
-                    <a:solidFill>
-                      <a:schemeClr val="lt1"/>
-                    </a:solidFill>
-                    <a:latin typeface="+mn-lt"/>
-                    <a:ea typeface="+mn-ea"/>
-                    <a:cs typeface="+mn-cs"/>
-                  </a:defRPr>
-                </a:lvl6pPr>
-                <a:lvl7pPr marL="2743200" indent="0">
-                  <a:defRPr sz="1100">
-                    <a:solidFill>
-                      <a:schemeClr val="lt1"/>
-                    </a:solidFill>
-                    <a:latin typeface="+mn-lt"/>
-                    <a:ea typeface="+mn-ea"/>
-                    <a:cs typeface="+mn-cs"/>
-                  </a:defRPr>
-                </a:lvl7pPr>
-                <a:lvl8pPr marL="3200400" indent="0">
-                  <a:defRPr sz="1100">
-                    <a:solidFill>
-                      <a:schemeClr val="lt1"/>
-                    </a:solidFill>
-                    <a:latin typeface="+mn-lt"/>
-                    <a:ea typeface="+mn-ea"/>
-                    <a:cs typeface="+mn-cs"/>
-                  </a:defRPr>
-                </a:lvl8pPr>
-                <a:lvl9pPr marL="3657600" indent="0">
-                  <a:defRPr sz="1100">
-                    <a:solidFill>
-                      <a:schemeClr val="lt1"/>
-                    </a:solidFill>
-                    <a:latin typeface="+mn-lt"/>
-                    <a:ea typeface="+mn-ea"/>
-                    <a:cs typeface="+mn-cs"/>
-                  </a:defRPr>
-                </a:lvl9pPr>
-              </a:lstStyle>
+              <a:lstStyle/>
               <a:p>
-                <a:pPr marL="0" indent="0" algn="ctr"/>
+                <a:pPr algn="ctr"/>
                 <a:r>
                   <a:rPr lang="pt-BR" sz="1400">
                     <a:solidFill>
@@ -16746,7 +15736,6 @@
                       </a:schemeClr>
                     </a:solidFill>
                     <a:latin typeface="Arial" pitchFamily="34" charset="0"/>
-                    <a:ea typeface="+mn-ea"/>
                     <a:cs typeface="Arial" pitchFamily="34" charset="0"/>
                   </a:rPr>
                   <a:t>CONFIABILIDADE</a:t>
@@ -16769,8 +15758,8 @@
                 <a:avLst/>
               </a:prstGeom>
               <a:solidFill>
-                <a:schemeClr val="bg1">
-                  <a:lumMod val="75000"/>
+                <a:schemeClr val="tx1">
+                  <a:lumMod val="85000"/>
                   <a:alpha val="50000"/>
                 </a:schemeClr>
               </a:solidFill>
@@ -16803,100 +15792,9 @@
             </p:style>
             <p:txBody>
               <a:bodyPr rtlCol="0" anchor="ctr"/>
-              <a:lstStyle>
-                <a:lvl1pPr marL="0" indent="0">
-                  <a:defRPr sz="1100">
-                    <a:solidFill>
-                      <a:schemeClr val="lt1"/>
-                    </a:solidFill>
-                    <a:latin typeface="+mn-lt"/>
-                    <a:ea typeface="+mn-ea"/>
-                    <a:cs typeface="+mn-cs"/>
-                  </a:defRPr>
-                </a:lvl1pPr>
-                <a:lvl2pPr marL="457200" indent="0">
-                  <a:defRPr sz="1100">
-                    <a:solidFill>
-                      <a:schemeClr val="lt1"/>
-                    </a:solidFill>
-                    <a:latin typeface="+mn-lt"/>
-                    <a:ea typeface="+mn-ea"/>
-                    <a:cs typeface="+mn-cs"/>
-                  </a:defRPr>
-                </a:lvl2pPr>
-                <a:lvl3pPr marL="914400" indent="0">
-                  <a:defRPr sz="1100">
-                    <a:solidFill>
-                      <a:schemeClr val="lt1"/>
-                    </a:solidFill>
-                    <a:latin typeface="+mn-lt"/>
-                    <a:ea typeface="+mn-ea"/>
-                    <a:cs typeface="+mn-cs"/>
-                  </a:defRPr>
-                </a:lvl3pPr>
-                <a:lvl4pPr marL="1371600" indent="0">
-                  <a:defRPr sz="1100">
-                    <a:solidFill>
-                      <a:schemeClr val="lt1"/>
-                    </a:solidFill>
-                    <a:latin typeface="+mn-lt"/>
-                    <a:ea typeface="+mn-ea"/>
-                    <a:cs typeface="+mn-cs"/>
-                  </a:defRPr>
-                </a:lvl4pPr>
-                <a:lvl5pPr marL="1828800" indent="0">
-                  <a:defRPr sz="1100">
-                    <a:solidFill>
-                      <a:schemeClr val="lt1"/>
-                    </a:solidFill>
-                    <a:latin typeface="+mn-lt"/>
-                    <a:ea typeface="+mn-ea"/>
-                    <a:cs typeface="+mn-cs"/>
-                  </a:defRPr>
-                </a:lvl5pPr>
-                <a:lvl6pPr marL="2286000" indent="0">
-                  <a:defRPr sz="1100">
-                    <a:solidFill>
-                      <a:schemeClr val="lt1"/>
-                    </a:solidFill>
-                    <a:latin typeface="+mn-lt"/>
-                    <a:ea typeface="+mn-ea"/>
-                    <a:cs typeface="+mn-cs"/>
-                  </a:defRPr>
-                </a:lvl6pPr>
-                <a:lvl7pPr marL="2743200" indent="0">
-                  <a:defRPr sz="1100">
-                    <a:solidFill>
-                      <a:schemeClr val="lt1"/>
-                    </a:solidFill>
-                    <a:latin typeface="+mn-lt"/>
-                    <a:ea typeface="+mn-ea"/>
-                    <a:cs typeface="+mn-cs"/>
-                  </a:defRPr>
-                </a:lvl7pPr>
-                <a:lvl8pPr marL="3200400" indent="0">
-                  <a:defRPr sz="1100">
-                    <a:solidFill>
-                      <a:schemeClr val="lt1"/>
-                    </a:solidFill>
-                    <a:latin typeface="+mn-lt"/>
-                    <a:ea typeface="+mn-ea"/>
-                    <a:cs typeface="+mn-cs"/>
-                  </a:defRPr>
-                </a:lvl8pPr>
-                <a:lvl9pPr marL="3657600" indent="0">
-                  <a:defRPr sz="1100">
-                    <a:solidFill>
-                      <a:schemeClr val="lt1"/>
-                    </a:solidFill>
-                    <a:latin typeface="+mn-lt"/>
-                    <a:ea typeface="+mn-ea"/>
-                    <a:cs typeface="+mn-cs"/>
-                  </a:defRPr>
-                </a:lvl9pPr>
-              </a:lstStyle>
+              <a:lstStyle/>
               <a:p>
-                <a:pPr marL="0" indent="0" algn="ctr"/>
+                <a:pPr algn="ctr"/>
                 <a:r>
                   <a:rPr lang="pt-BR" sz="1400">
                     <a:solidFill>
@@ -16906,7 +15804,6 @@
                       </a:schemeClr>
                     </a:solidFill>
                     <a:latin typeface="Arial" pitchFamily="34" charset="0"/>
-                    <a:ea typeface="+mn-ea"/>
                     <a:cs typeface="Arial" pitchFamily="34" charset="0"/>
                   </a:rPr>
                   <a:t>OPERABILIDADE</a:t>
@@ -16929,8 +15826,8 @@
                 <a:avLst/>
               </a:prstGeom>
               <a:solidFill>
-                <a:schemeClr val="bg1">
-                  <a:lumMod val="75000"/>
+                <a:schemeClr val="tx1">
+                  <a:lumMod val="85000"/>
                   <a:alpha val="50000"/>
                 </a:schemeClr>
               </a:solidFill>
@@ -16963,100 +15860,9 @@
             </p:style>
             <p:txBody>
               <a:bodyPr rtlCol="0" anchor="ctr"/>
-              <a:lstStyle>
-                <a:lvl1pPr marL="0" indent="0">
-                  <a:defRPr sz="1100">
-                    <a:solidFill>
-                      <a:schemeClr val="lt1"/>
-                    </a:solidFill>
-                    <a:latin typeface="+mn-lt"/>
-                    <a:ea typeface="+mn-ea"/>
-                    <a:cs typeface="+mn-cs"/>
-                  </a:defRPr>
-                </a:lvl1pPr>
-                <a:lvl2pPr marL="457200" indent="0">
-                  <a:defRPr sz="1100">
-                    <a:solidFill>
-                      <a:schemeClr val="lt1"/>
-                    </a:solidFill>
-                    <a:latin typeface="+mn-lt"/>
-                    <a:ea typeface="+mn-ea"/>
-                    <a:cs typeface="+mn-cs"/>
-                  </a:defRPr>
-                </a:lvl2pPr>
-                <a:lvl3pPr marL="914400" indent="0">
-                  <a:defRPr sz="1100">
-                    <a:solidFill>
-                      <a:schemeClr val="lt1"/>
-                    </a:solidFill>
-                    <a:latin typeface="+mn-lt"/>
-                    <a:ea typeface="+mn-ea"/>
-                    <a:cs typeface="+mn-cs"/>
-                  </a:defRPr>
-                </a:lvl3pPr>
-                <a:lvl4pPr marL="1371600" indent="0">
-                  <a:defRPr sz="1100">
-                    <a:solidFill>
-                      <a:schemeClr val="lt1"/>
-                    </a:solidFill>
-                    <a:latin typeface="+mn-lt"/>
-                    <a:ea typeface="+mn-ea"/>
-                    <a:cs typeface="+mn-cs"/>
-                  </a:defRPr>
-                </a:lvl4pPr>
-                <a:lvl5pPr marL="1828800" indent="0">
-                  <a:defRPr sz="1100">
-                    <a:solidFill>
-                      <a:schemeClr val="lt1"/>
-                    </a:solidFill>
-                    <a:latin typeface="+mn-lt"/>
-                    <a:ea typeface="+mn-ea"/>
-                    <a:cs typeface="+mn-cs"/>
-                  </a:defRPr>
-                </a:lvl5pPr>
-                <a:lvl6pPr marL="2286000" indent="0">
-                  <a:defRPr sz="1100">
-                    <a:solidFill>
-                      <a:schemeClr val="lt1"/>
-                    </a:solidFill>
-                    <a:latin typeface="+mn-lt"/>
-                    <a:ea typeface="+mn-ea"/>
-                    <a:cs typeface="+mn-cs"/>
-                  </a:defRPr>
-                </a:lvl6pPr>
-                <a:lvl7pPr marL="2743200" indent="0">
-                  <a:defRPr sz="1100">
-                    <a:solidFill>
-                      <a:schemeClr val="lt1"/>
-                    </a:solidFill>
-                    <a:latin typeface="+mn-lt"/>
-                    <a:ea typeface="+mn-ea"/>
-                    <a:cs typeface="+mn-cs"/>
-                  </a:defRPr>
-                </a:lvl7pPr>
-                <a:lvl8pPr marL="3200400" indent="0">
-                  <a:defRPr sz="1100">
-                    <a:solidFill>
-                      <a:schemeClr val="lt1"/>
-                    </a:solidFill>
-                    <a:latin typeface="+mn-lt"/>
-                    <a:ea typeface="+mn-ea"/>
-                    <a:cs typeface="+mn-cs"/>
-                  </a:defRPr>
-                </a:lvl8pPr>
-                <a:lvl9pPr marL="3657600" indent="0">
-                  <a:defRPr sz="1100">
-                    <a:solidFill>
-                      <a:schemeClr val="lt1"/>
-                    </a:solidFill>
-                    <a:latin typeface="+mn-lt"/>
-                    <a:ea typeface="+mn-ea"/>
-                    <a:cs typeface="+mn-cs"/>
-                  </a:defRPr>
-                </a:lvl9pPr>
-              </a:lstStyle>
+              <a:lstStyle/>
               <a:p>
-                <a:pPr marL="0" indent="0" algn="ctr"/>
+                <a:pPr algn="ctr"/>
                 <a:r>
                   <a:rPr lang="pt-BR" sz="1400">
                     <a:solidFill>
@@ -17066,7 +15872,6 @@
                       </a:schemeClr>
                     </a:solidFill>
                     <a:latin typeface="Arial" pitchFamily="34" charset="0"/>
-                    <a:ea typeface="+mn-ea"/>
                     <a:cs typeface="Arial" pitchFamily="34" charset="0"/>
                   </a:rPr>
                   <a:t>SEGURANÇA</a:t>
@@ -17089,8 +15894,8 @@
                 <a:avLst/>
               </a:prstGeom>
               <a:solidFill>
-                <a:schemeClr val="bg1">
-                  <a:lumMod val="75000"/>
+                <a:schemeClr val="tx1">
+                  <a:lumMod val="85000"/>
                   <a:alpha val="50000"/>
                 </a:schemeClr>
               </a:solidFill>
@@ -17123,100 +15928,9 @@
             </p:style>
             <p:txBody>
               <a:bodyPr rtlCol="0" anchor="ctr"/>
-              <a:lstStyle>
-                <a:lvl1pPr marL="0" indent="0">
-                  <a:defRPr sz="1100">
-                    <a:solidFill>
-                      <a:schemeClr val="lt1"/>
-                    </a:solidFill>
-                    <a:latin typeface="+mn-lt"/>
-                    <a:ea typeface="+mn-ea"/>
-                    <a:cs typeface="+mn-cs"/>
-                  </a:defRPr>
-                </a:lvl1pPr>
-                <a:lvl2pPr marL="457200" indent="0">
-                  <a:defRPr sz="1100">
-                    <a:solidFill>
-                      <a:schemeClr val="lt1"/>
-                    </a:solidFill>
-                    <a:latin typeface="+mn-lt"/>
-                    <a:ea typeface="+mn-ea"/>
-                    <a:cs typeface="+mn-cs"/>
-                  </a:defRPr>
-                </a:lvl2pPr>
-                <a:lvl3pPr marL="914400" indent="0">
-                  <a:defRPr sz="1100">
-                    <a:solidFill>
-                      <a:schemeClr val="lt1"/>
-                    </a:solidFill>
-                    <a:latin typeface="+mn-lt"/>
-                    <a:ea typeface="+mn-ea"/>
-                    <a:cs typeface="+mn-cs"/>
-                  </a:defRPr>
-                </a:lvl3pPr>
-                <a:lvl4pPr marL="1371600" indent="0">
-                  <a:defRPr sz="1100">
-                    <a:solidFill>
-                      <a:schemeClr val="lt1"/>
-                    </a:solidFill>
-                    <a:latin typeface="+mn-lt"/>
-                    <a:ea typeface="+mn-ea"/>
-                    <a:cs typeface="+mn-cs"/>
-                  </a:defRPr>
-                </a:lvl4pPr>
-                <a:lvl5pPr marL="1828800" indent="0">
-                  <a:defRPr sz="1100">
-                    <a:solidFill>
-                      <a:schemeClr val="lt1"/>
-                    </a:solidFill>
-                    <a:latin typeface="+mn-lt"/>
-                    <a:ea typeface="+mn-ea"/>
-                    <a:cs typeface="+mn-cs"/>
-                  </a:defRPr>
-                </a:lvl5pPr>
-                <a:lvl6pPr marL="2286000" indent="0">
-                  <a:defRPr sz="1100">
-                    <a:solidFill>
-                      <a:schemeClr val="lt1"/>
-                    </a:solidFill>
-                    <a:latin typeface="+mn-lt"/>
-                    <a:ea typeface="+mn-ea"/>
-                    <a:cs typeface="+mn-cs"/>
-                  </a:defRPr>
-                </a:lvl6pPr>
-                <a:lvl7pPr marL="2743200" indent="0">
-                  <a:defRPr sz="1100">
-                    <a:solidFill>
-                      <a:schemeClr val="lt1"/>
-                    </a:solidFill>
-                    <a:latin typeface="+mn-lt"/>
-                    <a:ea typeface="+mn-ea"/>
-                    <a:cs typeface="+mn-cs"/>
-                  </a:defRPr>
-                </a:lvl7pPr>
-                <a:lvl8pPr marL="3200400" indent="0">
-                  <a:defRPr sz="1100">
-                    <a:solidFill>
-                      <a:schemeClr val="lt1"/>
-                    </a:solidFill>
-                    <a:latin typeface="+mn-lt"/>
-                    <a:ea typeface="+mn-ea"/>
-                    <a:cs typeface="+mn-cs"/>
-                  </a:defRPr>
-                </a:lvl8pPr>
-                <a:lvl9pPr marL="3657600" indent="0">
-                  <a:defRPr sz="1100">
-                    <a:solidFill>
-                      <a:schemeClr val="lt1"/>
-                    </a:solidFill>
-                    <a:latin typeface="+mn-lt"/>
-                    <a:ea typeface="+mn-ea"/>
-                    <a:cs typeface="+mn-cs"/>
-                  </a:defRPr>
-                </a:lvl9pPr>
-              </a:lstStyle>
+              <a:lstStyle/>
               <a:p>
-                <a:pPr marL="0" indent="0" algn="ctr"/>
+                <a:pPr algn="ctr"/>
                 <a:r>
                   <a:rPr lang="pt-BR" sz="1400">
                     <a:solidFill>
@@ -17226,7 +15940,6 @@
                       </a:schemeClr>
                     </a:solidFill>
                     <a:latin typeface="Arial" pitchFamily="34" charset="0"/>
-                    <a:ea typeface="+mn-ea"/>
                     <a:cs typeface="Arial" pitchFamily="34" charset="0"/>
                   </a:rPr>
                   <a:t>COMPATIBILIDADE</a:t>
@@ -17249,8 +15962,8 @@
                 <a:avLst/>
               </a:prstGeom>
               <a:solidFill>
-                <a:schemeClr val="bg1">
-                  <a:lumMod val="75000"/>
+                <a:schemeClr val="tx1">
+                  <a:lumMod val="85000"/>
                   <a:alpha val="50000"/>
                 </a:schemeClr>
               </a:solidFill>
@@ -17409,8 +16122,8 @@
                 <a:avLst/>
               </a:prstGeom>
               <a:solidFill>
-                <a:schemeClr val="bg1">
-                  <a:lumMod val="75000"/>
+                <a:schemeClr val="tx1">
+                  <a:lumMod val="85000"/>
                   <a:alpha val="50000"/>
                 </a:schemeClr>
               </a:solidFill>
@@ -17443,100 +16156,9 @@
             </p:style>
             <p:txBody>
               <a:bodyPr rtlCol="0" anchor="ctr"/>
-              <a:lstStyle>
-                <a:lvl1pPr marL="0" indent="0">
-                  <a:defRPr sz="1100">
-                    <a:solidFill>
-                      <a:schemeClr val="lt1"/>
-                    </a:solidFill>
-                    <a:latin typeface="+mn-lt"/>
-                    <a:ea typeface="+mn-ea"/>
-                    <a:cs typeface="+mn-cs"/>
-                  </a:defRPr>
-                </a:lvl1pPr>
-                <a:lvl2pPr marL="457200" indent="0">
-                  <a:defRPr sz="1100">
-                    <a:solidFill>
-                      <a:schemeClr val="lt1"/>
-                    </a:solidFill>
-                    <a:latin typeface="+mn-lt"/>
-                    <a:ea typeface="+mn-ea"/>
-                    <a:cs typeface="+mn-cs"/>
-                  </a:defRPr>
-                </a:lvl2pPr>
-                <a:lvl3pPr marL="914400" indent="0">
-                  <a:defRPr sz="1100">
-                    <a:solidFill>
-                      <a:schemeClr val="lt1"/>
-                    </a:solidFill>
-                    <a:latin typeface="+mn-lt"/>
-                    <a:ea typeface="+mn-ea"/>
-                    <a:cs typeface="+mn-cs"/>
-                  </a:defRPr>
-                </a:lvl3pPr>
-                <a:lvl4pPr marL="1371600" indent="0">
-                  <a:defRPr sz="1100">
-                    <a:solidFill>
-                      <a:schemeClr val="lt1"/>
-                    </a:solidFill>
-                    <a:latin typeface="+mn-lt"/>
-                    <a:ea typeface="+mn-ea"/>
-                    <a:cs typeface="+mn-cs"/>
-                  </a:defRPr>
-                </a:lvl4pPr>
-                <a:lvl5pPr marL="1828800" indent="0">
-                  <a:defRPr sz="1100">
-                    <a:solidFill>
-                      <a:schemeClr val="lt1"/>
-                    </a:solidFill>
-                    <a:latin typeface="+mn-lt"/>
-                    <a:ea typeface="+mn-ea"/>
-                    <a:cs typeface="+mn-cs"/>
-                  </a:defRPr>
-                </a:lvl5pPr>
-                <a:lvl6pPr marL="2286000" indent="0">
-                  <a:defRPr sz="1100">
-                    <a:solidFill>
-                      <a:schemeClr val="lt1"/>
-                    </a:solidFill>
-                    <a:latin typeface="+mn-lt"/>
-                    <a:ea typeface="+mn-ea"/>
-                    <a:cs typeface="+mn-cs"/>
-                  </a:defRPr>
-                </a:lvl6pPr>
-                <a:lvl7pPr marL="2743200" indent="0">
-                  <a:defRPr sz="1100">
-                    <a:solidFill>
-                      <a:schemeClr val="lt1"/>
-                    </a:solidFill>
-                    <a:latin typeface="+mn-lt"/>
-                    <a:ea typeface="+mn-ea"/>
-                    <a:cs typeface="+mn-cs"/>
-                  </a:defRPr>
-                </a:lvl7pPr>
-                <a:lvl8pPr marL="3200400" indent="0">
-                  <a:defRPr sz="1100">
-                    <a:solidFill>
-                      <a:schemeClr val="lt1"/>
-                    </a:solidFill>
-                    <a:latin typeface="+mn-lt"/>
-                    <a:ea typeface="+mn-ea"/>
-                    <a:cs typeface="+mn-cs"/>
-                  </a:defRPr>
-                </a:lvl8pPr>
-                <a:lvl9pPr marL="3657600" indent="0">
-                  <a:defRPr sz="1100">
-                    <a:solidFill>
-                      <a:schemeClr val="lt1"/>
-                    </a:solidFill>
-                    <a:latin typeface="+mn-lt"/>
-                    <a:ea typeface="+mn-ea"/>
-                    <a:cs typeface="+mn-cs"/>
-                  </a:defRPr>
-                </a:lvl9pPr>
-              </a:lstStyle>
+              <a:lstStyle/>
               <a:p>
-                <a:pPr marL="0" indent="0" algn="ctr"/>
+                <a:pPr algn="ctr"/>
                 <a:r>
                   <a:rPr lang="pt-BR" sz="1400">
                     <a:solidFill>
@@ -17546,7 +16168,6 @@
                       </a:schemeClr>
                     </a:solidFill>
                     <a:latin typeface="Arial" pitchFamily="34" charset="0"/>
-                    <a:ea typeface="+mn-ea"/>
                     <a:cs typeface="Arial" pitchFamily="34" charset="0"/>
                   </a:rPr>
                   <a:t>EFICIÊNCIA</a:t>

</xml_diff>